<commit_message>
Regenerate Ansible PPTX with fixed converter
The solution briefing converter was updated to properly handle speaker
notes when scope parameters overflow the table. Regenerated Ansible
solution briefing PPTX successfully with all 17 scope parameters.

All 5 Ansible presales documents now generate without errors.
</commit_message>
<xml_diff>
--- a/solutions/ibm/devops/ansible-automation-platform/presales/solution-briefing.pptx
+++ b/solutions/ibm/devops/ansible-automation-platform/presales/solution-briefing.pptx
@@ -118,6 +118,9 @@
     <p:ext uri="{EFAFB233-063F-42B5-8137-9DF3F51BA10A}">
       <p15:sldGuideLst xmlns:p15="http://schemas.microsoft.com/office/powerpoint/2012/main"/>
     </p:ext>
+    <p:ext uri="{2D200454-40CA-4A62-9FC3-DE9A4176ACB9}">
+      <p15:notesGuideLst xmlns:p15="http://schemas.microsoft.com/office/powerpoint/2012/main"/>
+    </p:ext>
   </p:extLst>
 </p:presentation>
 </file>
@@ -144,6 +147,59 @@
           <a:chExt cx="0" cy="0"/>
         </a:xfrm>
       </p:grpSpPr>
+      <p:sp>
+        <p:nvSpPr>
+          <p:cNvPr id="2" name="Slide Image Placeholder 1"/>
+          <p:cNvSpPr>
+            <a:spLocks noGrp="1" noRot="1" noChangeAspect="1"/>
+          </p:cNvSpPr>
+          <p:nvPr>
+            <p:ph type="sldImg"/>
+          </p:nvPr>
+        </p:nvSpPr>
+        <p:spPr>
+          <a:xfrm>
+            <a:off x="-171450" y="1143000"/>
+            <a:ext cx="5486400" cy="3086100"/>
+          </a:xfrm>
+          <a:prstGeom prst="rect">
+            <a:avLst/>
+          </a:prstGeom>
+          <a:noFill/>
+          <a:ln w="12700">
+            <a:solidFill>
+              <a:prstClr val="black"/>
+            </a:solidFill>
+          </a:ln>
+        </p:spPr>
+      </p:sp>
+      <p:sp>
+        <p:nvSpPr>
+          <p:cNvPr id="3" name="Notes Placeholder 2"/>
+          <p:cNvSpPr>
+            <a:spLocks noGrp="1"/>
+          </p:cNvSpPr>
+          <p:nvPr>
+            <p:ph type="body" idx="1"/>
+          </p:nvPr>
+        </p:nvSpPr>
+        <p:spPr>
+          <a:xfrm>
+            <a:off x="514350" y="4400550"/>
+            <a:ext cx="4114800" cy="3600450"/>
+          </a:xfrm>
+          <a:prstGeom prst="rect">
+            <a:avLst/>
+          </a:prstGeom>
+        </p:spPr>
+        <p:txBody>
+          <a:bodyPr/>
+          <a:lstStyle/>
+          <a:p>
+            <a:endParaRPr lang="en-US"/>
+          </a:p>
+        </p:txBody>
+      </p:sp>
     </p:spTree>
     <p:extLst>
       <p:ext uri="{BB962C8B-B14F-4D97-AF65-F5344CB8AC3E}">
@@ -245,6 +301,70 @@
     </a:lvl9pPr>
   </p:notesStyle>
 </p:notesMaster>
+</file>
+
+<file path=ppt/notesSlides/notesSlide1.xml><?xml version="1.0" encoding="utf-8"?>
+<p:notes xmlns:a="http://schemas.openxmlformats.org/drawingml/2006/main" xmlns:p="http://schemas.openxmlformats.org/presentationml/2006/main" xmlns:r="http://schemas.openxmlformats.org/officeDocument/2006/relationships">
+  <p:cSld>
+    <p:spTree>
+      <p:nvGrpSpPr>
+        <p:cNvPr id="1" name=""/>
+        <p:cNvGrpSpPr/>
+        <p:nvPr/>
+      </p:nvGrpSpPr>
+      <p:grpSpPr>
+        <a:xfrm>
+          <a:off x="0" y="0"/>
+          <a:ext cx="0" cy="0"/>
+          <a:chOff x="0" y="0"/>
+          <a:chExt cx="0" cy="0"/>
+        </a:xfrm>
+      </p:grpSpPr>
+      <p:sp>
+        <p:nvSpPr>
+          <p:cNvPr id="2" name="Slide Image Placeholder 1"/>
+          <p:cNvSpPr>
+            <a:spLocks noGrp="1"/>
+          </p:cNvSpPr>
+          <p:nvPr>
+            <p:ph type="sldImg"/>
+          </p:nvPr>
+        </p:nvSpPr>
+        <p:spPr/>
+      </p:sp>
+      <p:sp>
+        <p:nvSpPr>
+          <p:cNvPr id="3" name="Notes Placeholder 2"/>
+          <p:cNvSpPr>
+            <a:spLocks noGrp="1"/>
+          </p:cNvSpPr>
+          <p:nvPr>
+            <p:ph type="body" idx="1"/>
+          </p:nvPr>
+        </p:nvSpPr>
+        <p:spPr/>
+        <p:txBody>
+          <a:bodyPr/>
+          <a:lstStyle/>
+          <a:p>
+            <a:r>
+              <a:t>Additional Scope Parameters (not displayed on slide):</a:t>
+            </a:r>
+          </a:p>
+          <a:p/>
+          <a:p>
+            <a:r>
+              <a:t>• Inventory Management: 600 managed nodes total</a:t>
+            </a:r>
+          </a:p>
+        </p:txBody>
+      </p:sp>
+    </p:spTree>
+  </p:cSld>
+  <p:clrMapOvr>
+    <a:masterClrMapping/>
+  </p:clrMapOvr>
+</p:notes>
 </file>
 
 <file path=ppt/slideLayouts/slideLayout1.xml><?xml version="1.0" encoding="utf-8"?>
@@ -3770,7 +3890,7 @@
         </p:nvGraphicFramePr>
         <p:xfrm>
           <a:off x="256855" y="677011"/>
-          <a:ext cx="8710929" cy="370840"/>
+          <a:ext cx="8710929" cy="3337560"/>
         </p:xfrm>
         <a:graphic>
           <a:graphicData uri="http://schemas.openxmlformats.org/drawingml/2006/table">
@@ -3879,6 +3999,662 @@
                   <a:tcPr>
                     <a:solidFill>
                       <a:srgbClr val="A01C02"/>
+                    </a:solidFill>
+                  </a:tcPr>
+                </a:tc>
+              </a:tr>
+              <a:tr h="370840">
+                <a:tc>
+                  <a:txBody>
+                    <a:bodyPr/>
+                    <a:lstStyle/>
+                    <a:p>
+                      <a:r>
+                        <a:rPr b="1" sz="1100"/>
+                        <a:t>Server Count</a:t>
+                      </a:r>
+                    </a:p>
+                  </a:txBody>
+                  <a:tcPr>
+                    <a:solidFill>
+                      <a:srgbClr val="E7E6E6"/>
+                    </a:solidFill>
+                  </a:tcPr>
+                </a:tc>
+                <a:tc>
+                  <a:txBody>
+                    <a:bodyPr/>
+                    <a:lstStyle/>
+                    <a:p>
+                      <a:r>
+                        <a:rPr sz="1100"/>
+                        <a:t>500 servers (Linux/Windows)</a:t>
+                      </a:r>
+                    </a:p>
+                  </a:txBody>
+                  <a:tcPr>
+                    <a:solidFill>
+                      <a:srgbClr val="E7E6E6"/>
+                    </a:solidFill>
+                  </a:tcPr>
+                </a:tc>
+                <a:tc>
+                  <a:txBody>
+                    <a:bodyPr/>
+                    <a:lstStyle/>
+                    <a:p/>
+                  </a:txBody>
+                  <a:tcPr>
+                    <a:solidFill>
+                      <a:srgbClr val="FFFFFF"/>
+                    </a:solidFill>
+                  </a:tcPr>
+                </a:tc>
+                <a:tc>
+                  <a:txBody>
+                    <a:bodyPr/>
+                    <a:lstStyle/>
+                    <a:p>
+                      <a:r>
+                        <a:rPr b="1" sz="1100"/>
+                        <a:t>Deployment Platform</a:t>
+                      </a:r>
+                    </a:p>
+                  </a:txBody>
+                  <a:tcPr>
+                    <a:solidFill>
+                      <a:srgbClr val="E7E6E6"/>
+                    </a:solidFill>
+                  </a:tcPr>
+                </a:tc>
+                <a:tc>
+                  <a:txBody>
+                    <a:bodyPr/>
+                    <a:lstStyle/>
+                    <a:p>
+                      <a:r>
+                        <a:rPr sz="1100"/>
+                        <a:t>AWS/Azure cloud infrastructure</a:t>
+                      </a:r>
+                    </a:p>
+                  </a:txBody>
+                  <a:tcPr>
+                    <a:solidFill>
+                      <a:srgbClr val="E7E6E6"/>
+                    </a:solidFill>
+                  </a:tcPr>
+                </a:tc>
+              </a:tr>
+              <a:tr h="370840">
+                <a:tc>
+                  <a:txBody>
+                    <a:bodyPr/>
+                    <a:lstStyle/>
+                    <a:p>
+                      <a:r>
+                        <a:rPr b="1" sz="1100"/>
+                        <a:t>Network Device Count</a:t>
+                      </a:r>
+                    </a:p>
+                  </a:txBody>
+                  <a:tcPr>
+                    <a:solidFill>
+                      <a:srgbClr val="E7E6E6"/>
+                    </a:solidFill>
+                  </a:tcPr>
+                </a:tc>
+                <a:tc>
+                  <a:txBody>
+                    <a:bodyPr/>
+                    <a:lstStyle/>
+                    <a:p>
+                      <a:r>
+                        <a:rPr sz="1100"/>
+                        <a:t>100 network devices</a:t>
+                      </a:r>
+                    </a:p>
+                  </a:txBody>
+                  <a:tcPr>
+                    <a:solidFill>
+                      <a:srgbClr val="E7E6E6"/>
+                    </a:solidFill>
+                  </a:tcPr>
+                </a:tc>
+                <a:tc>
+                  <a:txBody>
+                    <a:bodyPr/>
+                    <a:lstStyle/>
+                    <a:p/>
+                  </a:txBody>
+                  <a:tcPr>
+                    <a:solidFill>
+                      <a:srgbClr val="FFFFFF"/>
+                    </a:solidFill>
+                  </a:tcPr>
+                </a:tc>
+                <a:tc>
+                  <a:txBody>
+                    <a:bodyPr/>
+                    <a:lstStyle/>
+                    <a:p>
+                      <a:r>
+                        <a:rPr b="1" sz="1100"/>
+                        <a:t>Availability Requirements</a:t>
+                      </a:r>
+                    </a:p>
+                  </a:txBody>
+                  <a:tcPr>
+                    <a:solidFill>
+                      <a:srgbClr val="E7E6E6"/>
+                    </a:solidFill>
+                  </a:tcPr>
+                </a:tc>
+                <a:tc>
+                  <a:txBody>
+                    <a:bodyPr/>
+                    <a:lstStyle/>
+                    <a:p>
+                      <a:r>
+                        <a:rPr sz="1100"/>
+                        <a:t>HA controller cluster (99.5% uptime)</a:t>
+                      </a:r>
+                    </a:p>
+                  </a:txBody>
+                  <a:tcPr>
+                    <a:solidFill>
+                      <a:srgbClr val="E7E6E6"/>
+                    </a:solidFill>
+                  </a:tcPr>
+                </a:tc>
+              </a:tr>
+              <a:tr h="370840">
+                <a:tc>
+                  <a:txBody>
+                    <a:bodyPr/>
+                    <a:lstStyle/>
+                    <a:p>
+                      <a:r>
+                        <a:rPr b="1" sz="1100"/>
+                        <a:t>Playbook Count</a:t>
+                      </a:r>
+                    </a:p>
+                  </a:txBody>
+                  <a:tcPr>
+                    <a:solidFill>
+                      <a:srgbClr val="E7E6E6"/>
+                    </a:solidFill>
+                  </a:tcPr>
+                </a:tc>
+                <a:tc>
+                  <a:txBody>
+                    <a:bodyPr/>
+                    <a:lstStyle/>
+                    <a:p>
+                      <a:r>
+                        <a:rPr sz="1100"/>
+                        <a:t>100 custom automation playbooks</a:t>
+                      </a:r>
+                    </a:p>
+                  </a:txBody>
+                  <a:tcPr>
+                    <a:solidFill>
+                      <a:srgbClr val="E7E6E6"/>
+                    </a:solidFill>
+                  </a:tcPr>
+                </a:tc>
+                <a:tc>
+                  <a:txBody>
+                    <a:bodyPr/>
+                    <a:lstStyle/>
+                    <a:p/>
+                  </a:txBody>
+                  <a:tcPr>
+                    <a:solidFill>
+                      <a:srgbClr val="FFFFFF"/>
+                    </a:solidFill>
+                  </a:tcPr>
+                </a:tc>
+                <a:tc>
+                  <a:txBody>
+                    <a:bodyPr/>
+                    <a:lstStyle/>
+                    <a:p>
+                      <a:r>
+                        <a:rPr b="1" sz="1100"/>
+                        <a:t>Infrastructure Complexity</a:t>
+                      </a:r>
+                    </a:p>
+                  </a:txBody>
+                  <a:tcPr>
+                    <a:solidFill>
+                      <a:srgbClr val="E7E6E6"/>
+                    </a:solidFill>
+                  </a:tcPr>
+                </a:tc>
+                <a:tc>
+                  <a:txBody>
+                    <a:bodyPr/>
+                    <a:lstStyle/>
+                    <a:p>
+                      <a:r>
+                        <a:rPr sz="1100"/>
+                        <a:t>Controller HA + distributed execution nodes</a:t>
+                      </a:r>
+                    </a:p>
+                  </a:txBody>
+                  <a:tcPr>
+                    <a:solidFill>
+                      <a:srgbClr val="E7E6E6"/>
+                    </a:solidFill>
+                  </a:tcPr>
+                </a:tc>
+              </a:tr>
+              <a:tr h="370840">
+                <a:tc>
+                  <a:txBody>
+                    <a:bodyPr/>
+                    <a:lstStyle/>
+                    <a:p>
+                      <a:r>
+                        <a:rPr b="1" sz="1100"/>
+                        <a:t>ITSM Integration</a:t>
+                      </a:r>
+                    </a:p>
+                  </a:txBody>
+                  <a:tcPr>
+                    <a:solidFill>
+                      <a:srgbClr val="E7E6E6"/>
+                    </a:solidFill>
+                  </a:tcPr>
+                </a:tc>
+                <a:tc>
+                  <a:txBody>
+                    <a:bodyPr/>
+                    <a:lstStyle/>
+                    <a:p>
+                      <a:r>
+                        <a:rPr sz="1100"/>
+                        <a:t>ServiceNow ticket-driven workflows</a:t>
+                      </a:r>
+                    </a:p>
+                  </a:txBody>
+                  <a:tcPr>
+                    <a:solidFill>
+                      <a:srgbClr val="E7E6E6"/>
+                    </a:solidFill>
+                  </a:tcPr>
+                </a:tc>
+                <a:tc>
+                  <a:txBody>
+                    <a:bodyPr/>
+                    <a:lstStyle/>
+                    <a:p/>
+                  </a:txBody>
+                  <a:tcPr>
+                    <a:solidFill>
+                      <a:srgbClr val="FFFFFF"/>
+                    </a:solidFill>
+                  </a:tcPr>
+                </a:tc>
+                <a:tc>
+                  <a:txBody>
+                    <a:bodyPr/>
+                    <a:lstStyle/>
+                    <a:p>
+                      <a:r>
+                        <a:rPr b="1" sz="1100"/>
+                        <a:t>Security Requirements</a:t>
+                      </a:r>
+                    </a:p>
+                  </a:txBody>
+                  <a:tcPr>
+                    <a:solidFill>
+                      <a:srgbClr val="E7E6E6"/>
+                    </a:solidFill>
+                  </a:tcPr>
+                </a:tc>
+                <a:tc>
+                  <a:txBody>
+                    <a:bodyPr/>
+                    <a:lstStyle/>
+                    <a:p>
+                      <a:r>
+                        <a:rPr sz="1100"/>
+                        <a:t>RBAC + credential vault integration</a:t>
+                      </a:r>
+                    </a:p>
+                  </a:txBody>
+                  <a:tcPr>
+                    <a:solidFill>
+                      <a:srgbClr val="E7E6E6"/>
+                    </a:solidFill>
+                  </a:tcPr>
+                </a:tc>
+              </a:tr>
+              <a:tr h="370840">
+                <a:tc>
+                  <a:txBody>
+                    <a:bodyPr/>
+                    <a:lstStyle/>
+                    <a:p>
+                      <a:r>
+                        <a:rPr b="1" sz="1100"/>
+                        <a:t>External Systems</a:t>
+                      </a:r>
+                    </a:p>
+                  </a:txBody>
+                  <a:tcPr>
+                    <a:solidFill>
+                      <a:srgbClr val="E7E6E6"/>
+                    </a:solidFill>
+                  </a:tcPr>
+                </a:tc>
+                <a:tc>
+                  <a:txBody>
+                    <a:bodyPr/>
+                    <a:lstStyle/>
+                    <a:p>
+                      <a:r>
+                        <a:rPr sz="1100"/>
+                        <a:t>Monitoring systems + credential vault</a:t>
+                      </a:r>
+                    </a:p>
+                  </a:txBody>
+                  <a:tcPr>
+                    <a:solidFill>
+                      <a:srgbClr val="E7E6E6"/>
+                    </a:solidFill>
+                  </a:tcPr>
+                </a:tc>
+                <a:tc>
+                  <a:txBody>
+                    <a:bodyPr/>
+                    <a:lstStyle/>
+                    <a:p/>
+                  </a:txBody>
+                  <a:tcPr>
+                    <a:solidFill>
+                      <a:srgbClr val="FFFFFF"/>
+                    </a:solidFill>
+                  </a:tcPr>
+                </a:tc>
+                <a:tc>
+                  <a:txBody>
+                    <a:bodyPr/>
+                    <a:lstStyle/>
+                    <a:p>
+                      <a:r>
+                        <a:rPr b="1" sz="1100"/>
+                        <a:t>Compliance Frameworks</a:t>
+                      </a:r>
+                    </a:p>
+                  </a:txBody>
+                  <a:tcPr>
+                    <a:solidFill>
+                      <a:srgbClr val="E7E6E6"/>
+                    </a:solidFill>
+                  </a:tcPr>
+                </a:tc>
+                <a:tc>
+                  <a:txBody>
+                    <a:bodyPr/>
+                    <a:lstStyle/>
+                    <a:p>
+                      <a:r>
+                        <a:rPr sz="1100"/>
+                        <a:t>SOC2 ISO 27001</a:t>
+                      </a:r>
+                    </a:p>
+                  </a:txBody>
+                  <a:tcPr>
+                    <a:solidFill>
+                      <a:srgbClr val="E7E6E6"/>
+                    </a:solidFill>
+                  </a:tcPr>
+                </a:tc>
+              </a:tr>
+              <a:tr h="370840">
+                <a:tc>
+                  <a:txBody>
+                    <a:bodyPr/>
+                    <a:lstStyle/>
+                    <a:p>
+                      <a:r>
+                        <a:rPr b="1" sz="1100"/>
+                        <a:t>Automation Users</a:t>
+                      </a:r>
+                    </a:p>
+                  </a:txBody>
+                  <a:tcPr>
+                    <a:solidFill>
+                      <a:srgbClr val="E7E6E6"/>
+                    </a:solidFill>
+                  </a:tcPr>
+                </a:tc>
+                <a:tc>
+                  <a:txBody>
+                    <a:bodyPr/>
+                    <a:lstStyle/>
+                    <a:p>
+                      <a:r>
+                        <a:rPr sz="1100"/>
+                        <a:t>50 operations staff</a:t>
+                      </a:r>
+                    </a:p>
+                  </a:txBody>
+                  <a:tcPr>
+                    <a:solidFill>
+                      <a:srgbClr val="E7E6E6"/>
+                    </a:solidFill>
+                  </a:tcPr>
+                </a:tc>
+                <a:tc>
+                  <a:txBody>
+                    <a:bodyPr/>
+                    <a:lstStyle/>
+                    <a:p/>
+                  </a:txBody>
+                  <a:tcPr>
+                    <a:solidFill>
+                      <a:srgbClr val="FFFFFF"/>
+                    </a:solidFill>
+                  </a:tcPr>
+                </a:tc>
+                <a:tc>
+                  <a:txBody>
+                    <a:bodyPr/>
+                    <a:lstStyle/>
+                    <a:p>
+                      <a:r>
+                        <a:rPr b="1" sz="1100"/>
+                        <a:t>Execution Capacity</a:t>
+                      </a:r>
+                    </a:p>
+                  </a:txBody>
+                  <a:tcPr>
+                    <a:solidFill>
+                      <a:srgbClr val="E7E6E6"/>
+                    </a:solidFill>
+                  </a:tcPr>
+                </a:tc>
+                <a:tc>
+                  <a:txBody>
+                    <a:bodyPr/>
+                    <a:lstStyle/>
+                    <a:p>
+                      <a:r>
+                        <a:rPr sz="1100"/>
+                        <a:t>100 concurrent job executions</a:t>
+                      </a:r>
+                    </a:p>
+                  </a:txBody>
+                  <a:tcPr>
+                    <a:solidFill>
+                      <a:srgbClr val="E7E6E6"/>
+                    </a:solidFill>
+                  </a:tcPr>
+                </a:tc>
+              </a:tr>
+              <a:tr h="370840">
+                <a:tc>
+                  <a:txBody>
+                    <a:bodyPr/>
+                    <a:lstStyle/>
+                    <a:p>
+                      <a:r>
+                        <a:rPr b="1" sz="1100"/>
+                        <a:t>User Roles</a:t>
+                      </a:r>
+                    </a:p>
+                  </a:txBody>
+                  <a:tcPr>
+                    <a:solidFill>
+                      <a:srgbClr val="E7E6E6"/>
+                    </a:solidFill>
+                  </a:tcPr>
+                </a:tc>
+                <a:tc>
+                  <a:txBody>
+                    <a:bodyPr/>
+                    <a:lstStyle/>
+                    <a:p>
+                      <a:r>
+                        <a:rPr sz="1100"/>
+                        <a:t>5 roles (operator admin developer approver auditor)</a:t>
+                      </a:r>
+                    </a:p>
+                  </a:txBody>
+                  <a:tcPr>
+                    <a:solidFill>
+                      <a:srgbClr val="E7E6E6"/>
+                    </a:solidFill>
+                  </a:tcPr>
+                </a:tc>
+                <a:tc>
+                  <a:txBody>
+                    <a:bodyPr/>
+                    <a:lstStyle/>
+                    <a:p/>
+                  </a:txBody>
+                  <a:tcPr>
+                    <a:solidFill>
+                      <a:srgbClr val="FFFFFF"/>
+                    </a:solidFill>
+                  </a:tcPr>
+                </a:tc>
+                <a:tc>
+                  <a:txBody>
+                    <a:bodyPr/>
+                    <a:lstStyle/>
+                    <a:p>
+                      <a:r>
+                        <a:rPr b="1" sz="1100"/>
+                        <a:t>Automation Orchestration</a:t>
+                      </a:r>
+                    </a:p>
+                  </a:txBody>
+                  <a:tcPr>
+                    <a:solidFill>
+                      <a:srgbClr val="E7E6E6"/>
+                    </a:solidFill>
+                  </a:tcPr>
+                </a:tc>
+                <a:tc>
+                  <a:txBody>
+                    <a:bodyPr/>
+                    <a:lstStyle/>
+                    <a:p>
+                      <a:r>
+                        <a:rPr sz="1100"/>
+                        <a:t>Event-driven automation + scheduled jobs</a:t>
+                      </a:r>
+                    </a:p>
+                  </a:txBody>
+                  <a:tcPr>
+                    <a:solidFill>
+                      <a:srgbClr val="E7E6E6"/>
+                    </a:solidFill>
+                  </a:tcPr>
+                </a:tc>
+              </a:tr>
+              <a:tr h="370840">
+                <a:tc>
+                  <a:txBody>
+                    <a:bodyPr/>
+                    <a:lstStyle/>
+                    <a:p>
+                      <a:r>
+                        <a:rPr b="1" sz="1100"/>
+                        <a:t>Automation Executions</a:t>
+                      </a:r>
+                    </a:p>
+                  </a:txBody>
+                  <a:tcPr>
+                    <a:solidFill>
+                      <a:srgbClr val="E7E6E6"/>
+                    </a:solidFill>
+                  </a:tcPr>
+                </a:tc>
+                <a:tc>
+                  <a:txBody>
+                    <a:bodyPr/>
+                    <a:lstStyle/>
+                    <a:p>
+                      <a:r>
+                        <a:rPr sz="1100"/>
+                        <a:t>10000+ job runs per month</a:t>
+                      </a:r>
+                    </a:p>
+                  </a:txBody>
+                  <a:tcPr>
+                    <a:solidFill>
+                      <a:srgbClr val="E7E6E6"/>
+                    </a:solidFill>
+                  </a:tcPr>
+                </a:tc>
+                <a:tc>
+                  <a:txBody>
+                    <a:bodyPr/>
+                    <a:lstStyle/>
+                    <a:p/>
+                  </a:txBody>
+                  <a:tcPr>
+                    <a:solidFill>
+                      <a:srgbClr val="FFFFFF"/>
+                    </a:solidFill>
+                  </a:tcPr>
+                </a:tc>
+                <a:tc>
+                  <a:txBody>
+                    <a:bodyPr/>
+                    <a:lstStyle/>
+                    <a:p>
+                      <a:r>
+                        <a:rPr b="1" sz="1100"/>
+                        <a:t>Deployment Environments</a:t>
+                      </a:r>
+                    </a:p>
+                  </a:txBody>
+                  <a:tcPr>
+                    <a:solidFill>
+                      <a:srgbClr val="E7E6E6"/>
+                    </a:solidFill>
+                  </a:tcPr>
+                </a:tc>
+                <a:tc>
+                  <a:txBody>
+                    <a:bodyPr/>
+                    <a:lstStyle/>
+                    <a:p>
+                      <a:r>
+                        <a:rPr sz="1100"/>
+                        <a:t>2 environments (dev/staging + prod)</a:t>
+                      </a:r>
+                    </a:p>
+                  </a:txBody>
+                  <a:tcPr>
+                    <a:solidFill>
+                      <a:srgbClr val="E7E6E6"/>
                     </a:solidFill>
                   </a:tcPr>
                 </a:tc>

</xml_diff>